<commit_message>
Alteracoes relevantes na pagina contatos
</commit_message>
<xml_diff>
--- a/Layout.pptx
+++ b/Layout.pptx
@@ -293,7 +293,7 @@
             <a:fld id="{C43A422B-80D0-4EE9-ACB9-3CC9B3EA23CE}" type="datetimeFigureOut">
               <a:rPr lang="pt-BR" smtClean="0"/>
               <a:pPr/>
-              <a:t>02/06/2018</a:t>
+              <a:t>08/06/2018</a:t>
             </a:fld>
             <a:endParaRPr lang="pt-BR"/>
           </a:p>
@@ -460,7 +460,7 @@
             <a:fld id="{C43A422B-80D0-4EE9-ACB9-3CC9B3EA23CE}" type="datetimeFigureOut">
               <a:rPr lang="pt-BR" smtClean="0"/>
               <a:pPr/>
-              <a:t>02/06/2018</a:t>
+              <a:t>08/06/2018</a:t>
             </a:fld>
             <a:endParaRPr lang="pt-BR"/>
           </a:p>
@@ -637,7 +637,7 @@
             <a:fld id="{C43A422B-80D0-4EE9-ACB9-3CC9B3EA23CE}" type="datetimeFigureOut">
               <a:rPr lang="pt-BR" smtClean="0"/>
               <a:pPr/>
-              <a:t>02/06/2018</a:t>
+              <a:t>08/06/2018</a:t>
             </a:fld>
             <a:endParaRPr lang="pt-BR"/>
           </a:p>
@@ -804,7 +804,7 @@
             <a:fld id="{C43A422B-80D0-4EE9-ACB9-3CC9B3EA23CE}" type="datetimeFigureOut">
               <a:rPr lang="pt-BR" smtClean="0"/>
               <a:pPr/>
-              <a:t>02/06/2018</a:t>
+              <a:t>08/06/2018</a:t>
             </a:fld>
             <a:endParaRPr lang="pt-BR"/>
           </a:p>
@@ -1047,7 +1047,7 @@
             <a:fld id="{C43A422B-80D0-4EE9-ACB9-3CC9B3EA23CE}" type="datetimeFigureOut">
               <a:rPr lang="pt-BR" smtClean="0"/>
               <a:pPr/>
-              <a:t>02/06/2018</a:t>
+              <a:t>08/06/2018</a:t>
             </a:fld>
             <a:endParaRPr lang="pt-BR"/>
           </a:p>
@@ -1332,7 +1332,7 @@
             <a:fld id="{C43A422B-80D0-4EE9-ACB9-3CC9B3EA23CE}" type="datetimeFigureOut">
               <a:rPr lang="pt-BR" smtClean="0"/>
               <a:pPr/>
-              <a:t>02/06/2018</a:t>
+              <a:t>08/06/2018</a:t>
             </a:fld>
             <a:endParaRPr lang="pt-BR"/>
           </a:p>
@@ -1751,7 +1751,7 @@
             <a:fld id="{C43A422B-80D0-4EE9-ACB9-3CC9B3EA23CE}" type="datetimeFigureOut">
               <a:rPr lang="pt-BR" smtClean="0"/>
               <a:pPr/>
-              <a:t>02/06/2018</a:t>
+              <a:t>08/06/2018</a:t>
             </a:fld>
             <a:endParaRPr lang="pt-BR"/>
           </a:p>
@@ -1866,7 +1866,7 @@
             <a:fld id="{C43A422B-80D0-4EE9-ACB9-3CC9B3EA23CE}" type="datetimeFigureOut">
               <a:rPr lang="pt-BR" smtClean="0"/>
               <a:pPr/>
-              <a:t>02/06/2018</a:t>
+              <a:t>08/06/2018</a:t>
             </a:fld>
             <a:endParaRPr lang="pt-BR"/>
           </a:p>
@@ -1958,7 +1958,7 @@
             <a:fld id="{C43A422B-80D0-4EE9-ACB9-3CC9B3EA23CE}" type="datetimeFigureOut">
               <a:rPr lang="pt-BR" smtClean="0"/>
               <a:pPr/>
-              <a:t>02/06/2018</a:t>
+              <a:t>08/06/2018</a:t>
             </a:fld>
             <a:endParaRPr lang="pt-BR"/>
           </a:p>
@@ -2232,7 +2232,7 @@
             <a:fld id="{C43A422B-80D0-4EE9-ACB9-3CC9B3EA23CE}" type="datetimeFigureOut">
               <a:rPr lang="pt-BR" smtClean="0"/>
               <a:pPr/>
-              <a:t>02/06/2018</a:t>
+              <a:t>08/06/2018</a:t>
             </a:fld>
             <a:endParaRPr lang="pt-BR"/>
           </a:p>
@@ -2482,7 +2482,7 @@
             <a:fld id="{C43A422B-80D0-4EE9-ACB9-3CC9B3EA23CE}" type="datetimeFigureOut">
               <a:rPr lang="pt-BR" smtClean="0"/>
               <a:pPr/>
-              <a:t>02/06/2018</a:t>
+              <a:t>08/06/2018</a:t>
             </a:fld>
             <a:endParaRPr lang="pt-BR"/>
           </a:p>
@@ -2698,7 +2698,7 @@
             <a:fld id="{C43A422B-80D0-4EE9-ACB9-3CC9B3EA23CE}" type="datetimeFigureOut">
               <a:rPr lang="pt-BR" smtClean="0"/>
               <a:pPr/>
-              <a:t>02/06/2018</a:t>
+              <a:t>08/06/2018</a:t>
             </a:fld>
             <a:endParaRPr lang="pt-BR"/>
           </a:p>
@@ -3229,8 +3229,8 @@
         </p:nvSpPr>
         <p:spPr>
           <a:xfrm>
-            <a:off x="-32" y="6143644"/>
-            <a:ext cx="9144000" cy="714380"/>
+            <a:off x="-32" y="6597352"/>
+            <a:ext cx="9144000" cy="260672"/>
           </a:xfrm>
           <a:prstGeom prst="roundRect">
             <a:avLst/>
@@ -5449,15 +5449,7 @@
                   <a:schemeClr val="tx1"/>
                 </a:solidFill>
               </a:rPr>
-              <a:t>http://</a:t>
-            </a:r>
-            <a:r>
-              <a:rPr lang="pt-BR" dirty="0" smtClean="0">
-                <a:solidFill>
-                  <a:schemeClr val="tx1"/>
-                </a:solidFill>
-              </a:rPr>
-              <a:t>www.pantanal.turismo.br/Reservas.html</a:t>
+              <a:t>http://www.pantanal.turismo.br/Reservas.html</a:t>
             </a:r>
             <a:endParaRPr lang="pt-BR" dirty="0">
               <a:solidFill>
@@ -5506,8 +5498,8 @@
         </p:nvSpPr>
         <p:spPr>
           <a:xfrm>
-            <a:off x="-32" y="6143644"/>
-            <a:ext cx="9144000" cy="714380"/>
+            <a:off x="-32" y="6597352"/>
+            <a:ext cx="9144000" cy="260672"/>
           </a:xfrm>
           <a:prstGeom prst="roundRect">
             <a:avLst/>
@@ -6107,15 +6099,7 @@
                   <a:schemeClr val="tx1"/>
                 </a:solidFill>
               </a:rPr>
-              <a:t>http://</a:t>
-            </a:r>
-            <a:r>
-              <a:rPr lang="pt-BR" dirty="0" smtClean="0">
-                <a:solidFill>
-                  <a:schemeClr val="tx1"/>
-                </a:solidFill>
-              </a:rPr>
-              <a:t>www.pantanal.turismo.br/Produtoseservicos.html</a:t>
+              <a:t>http://www.pantanal.turismo.br/Produtoseservicos.html</a:t>
             </a:r>
             <a:endParaRPr lang="pt-BR" dirty="0">
               <a:solidFill>
@@ -6164,8 +6148,8 @@
         </p:nvSpPr>
         <p:spPr>
           <a:xfrm>
-            <a:off x="-32" y="6143644"/>
-            <a:ext cx="9144000" cy="714380"/>
+            <a:off x="-32" y="6597352"/>
+            <a:ext cx="9144000" cy="260672"/>
           </a:xfrm>
           <a:prstGeom prst="roundRect">
             <a:avLst/>
@@ -7151,15 +7135,7 @@
                   <a:schemeClr val="tx1"/>
                 </a:solidFill>
               </a:rPr>
-              <a:t>http://</a:t>
-            </a:r>
-            <a:r>
-              <a:rPr lang="pt-BR" dirty="0" smtClean="0">
-                <a:solidFill>
-                  <a:schemeClr val="tx1"/>
-                </a:solidFill>
-              </a:rPr>
-              <a:t>www.pantanal.turismo.br/Contato.html</a:t>
+              <a:t>http://www.pantanal.turismo.br/Contato.html</a:t>
             </a:r>
             <a:endParaRPr lang="pt-BR" dirty="0">
               <a:solidFill>
@@ -7208,8 +7184,8 @@
         </p:nvSpPr>
         <p:spPr>
           <a:xfrm>
-            <a:off x="-32" y="6143644"/>
-            <a:ext cx="9144000" cy="714380"/>
+            <a:off x="-32" y="6597352"/>
+            <a:ext cx="9144000" cy="260672"/>
           </a:xfrm>
           <a:prstGeom prst="roundRect">
             <a:avLst/>
@@ -7429,7 +7405,7 @@
                   <a:schemeClr val="tx1"/>
                 </a:solidFill>
               </a:rPr>
-              <a:t>Vendas</a:t>
+              <a:t>Reservas</a:t>
             </a:r>
             <a:endParaRPr lang="pt-BR" dirty="0">
               <a:solidFill>
@@ -8338,15 +8314,7 @@
                   <a:schemeClr val="tx1"/>
                 </a:solidFill>
               </a:rPr>
-              <a:t>http://</a:t>
-            </a:r>
-            <a:r>
-              <a:rPr lang="pt-BR" dirty="0" smtClean="0">
-                <a:solidFill>
-                  <a:schemeClr val="tx1"/>
-                </a:solidFill>
-              </a:rPr>
-              <a:t>www.pantanal.turismo.br/Sobre.html</a:t>
+              <a:t>http://www.pantanal.turismo.br/Sobre.html</a:t>
             </a:r>
             <a:endParaRPr lang="pt-BR" dirty="0">
               <a:solidFill>
@@ -8395,8 +8363,8 @@
         </p:nvSpPr>
         <p:spPr>
           <a:xfrm>
-            <a:off x="-32" y="6143644"/>
-            <a:ext cx="9144000" cy="714380"/>
+            <a:off x="-32" y="6597352"/>
+            <a:ext cx="9144000" cy="260672"/>
           </a:xfrm>
           <a:prstGeom prst="roundRect">
             <a:avLst/>
@@ -8616,7 +8584,7 @@
                   <a:schemeClr val="tx1"/>
                 </a:solidFill>
               </a:rPr>
-              <a:t>Vendas</a:t>
+              <a:t>Reservas</a:t>
             </a:r>
             <a:endParaRPr lang="pt-BR" dirty="0">
               <a:solidFill>

</xml_diff>